<commit_message>
update guardduty and config and inspector
</commit_message>
<xml_diff>
--- a/DevOpsPipeline.pptx
+++ b/DevOpsPipeline.pptx
@@ -5837,7 +5837,7 @@
         <p:spPr>
           <a:xfrm>
             <a:off x="1606375" y="2971100"/>
-            <a:ext cx="628409" cy="348740"/>
+            <a:ext cx="534845" cy="274585"/>
           </a:xfrm>
           <a:prstGeom prst="bentConnector3">
             <a:avLst>
@@ -5903,7 +5903,7 @@
         <p:spPr>
           <a:xfrm>
             <a:off x="2209194" y="1825840"/>
-            <a:ext cx="1491396" cy="597600"/>
+            <a:ext cx="1491396" cy="745910"/>
           </a:xfrm>
           <a:prstGeom prst="rect">
             <a:avLst/>
@@ -5921,15 +5921,7 @@
           </a:bodyPr>
           <a:lstStyle/>
           <a:p>
-            <a:pPr marL="0" lvl="0" indent="0" algn="ctr" rtl="0">
-              <a:spcBef>
-                <a:spcPts val="0"/>
-              </a:spcBef>
-              <a:spcAft>
-                <a:spcPts val="0"/>
-              </a:spcAft>
-              <a:buNone/>
-            </a:pPr>
+            <a:pPr algn="ctr"/>
             <a:r>
               <a:rPr lang="en-UM" sz="1100" dirty="0"/>
               <a:t>C</a:t>
@@ -5950,6 +5942,25 @@
               <a:rPr lang="en" sz="1000" dirty="0"/>
               <a:t>application container or OS image</a:t>
             </a:r>
+            <a:r>
+              <a:rPr lang="en-UM" sz="1000" dirty="0"/>
+              <a:t> using </a:t>
+            </a:r>
+            <a:r>
+              <a:rPr lang="en-GB" sz="1100" b="1" dirty="0"/>
+              <a:t>OpenVAS</a:t>
+            </a:r>
+          </a:p>
+          <a:p>
+            <a:pPr marL="0" lvl="0" indent="0" algn="ctr" rtl="0">
+              <a:spcBef>
+                <a:spcPts val="0"/>
+              </a:spcBef>
+              <a:spcAft>
+                <a:spcPts val="0"/>
+              </a:spcAft>
+              <a:buNone/>
+            </a:pPr>
             <a:endParaRPr sz="1000" dirty="0"/>
           </a:p>
         </p:txBody>
@@ -6010,8 +6021,8 @@
         </p:nvCxnSpPr>
         <p:spPr>
           <a:xfrm>
-            <a:off x="3700590" y="2124640"/>
-            <a:ext cx="1088822" cy="248860"/>
+            <a:off x="3700590" y="2198795"/>
+            <a:ext cx="1088822" cy="174705"/>
           </a:xfrm>
           <a:prstGeom prst="bentConnector2">
             <a:avLst/>
@@ -6042,8 +6053,8 @@
         </p:nvSpPr>
         <p:spPr>
           <a:xfrm>
-            <a:off x="2234784" y="3021040"/>
-            <a:ext cx="1491396" cy="597600"/>
+            <a:off x="2141220" y="2872730"/>
+            <a:ext cx="1584960" cy="745910"/>
           </a:xfrm>
           <a:prstGeom prst="rect">
             <a:avLst/>
@@ -6061,28 +6072,40 @@
           </a:bodyPr>
           <a:lstStyle/>
           <a:p>
-            <a:pPr marL="0" lvl="0" indent="0" algn="ctr" rtl="0">
-              <a:spcBef>
-                <a:spcPts val="0"/>
-              </a:spcBef>
-              <a:spcAft>
-                <a:spcPts val="0"/>
-              </a:spcAft>
-              <a:buNone/>
-            </a:pPr>
+            <a:pPr algn="ctr"/>
             <a:r>
-              <a:rPr lang="en-UM" sz="1400" dirty="0" err="1"/>
+              <a:rPr lang="en-GB" sz="1200" dirty="0" err="1"/>
               <a:t>Iac</a:t>
             </a:r>
             <a:r>
-              <a:rPr lang="en-UM" sz="1400" dirty="0"/>
-              <a:t> </a:t>
+              <a:rPr lang="en-GB" sz="1200" dirty="0"/>
+              <a:t> compliance scanning using </a:t>
             </a:r>
             <a:r>
-              <a:rPr lang="fr-FR" sz="1400" dirty="0"/>
-              <a:t>compliance scanning</a:t>
+              <a:rPr lang="en-GB" sz="1200" b="1" dirty="0"/>
+              <a:t>Nikto2</a:t>
             </a:r>
-            <a:endParaRPr sz="1000" dirty="0"/>
+            <a:r>
+              <a:rPr lang="en-UM" sz="1200" b="1" dirty="0"/>
+              <a:t>, </a:t>
+            </a:r>
+            <a:r>
+              <a:rPr lang="en-GB" sz="1200" b="1" dirty="0" err="1"/>
+              <a:t>Netsparker</a:t>
+            </a:r>
+            <a:endParaRPr lang="en-GB" sz="1200" b="1" dirty="0"/>
+          </a:p>
+          <a:p>
+            <a:pPr marL="0" lvl="0" indent="0" algn="ctr" rtl="0">
+              <a:spcBef>
+                <a:spcPts val="0"/>
+              </a:spcBef>
+              <a:spcAft>
+                <a:spcPts val="0"/>
+              </a:spcAft>
+              <a:buNone/>
+            </a:pPr>
+            <a:endParaRPr lang="en-GB" sz="1200" b="1" dirty="0"/>
           </a:p>
         </p:txBody>
       </p:sp>
@@ -6105,7 +6128,7 @@
         <p:spPr>
           <a:xfrm flipV="1">
             <a:off x="3726180" y="2971100"/>
-            <a:ext cx="1063232" cy="348740"/>
+            <a:ext cx="1063232" cy="274585"/>
           </a:xfrm>
           <a:prstGeom prst="bentConnector2">
             <a:avLst/>

</xml_diff>